<commit_message>
extra links in slide
</commit_message>
<xml_diff>
--- a/Functors, Comonads, and Digital Image Processing/FCDIP-LambdaConf16.pptx
+++ b/Functors, Comonads, and Digital Image Processing/FCDIP-LambdaConf16.pptx
@@ -16043,7 +16043,9 @@
         </p:nvSpPr>
         <p:spPr/>
         <p:txBody>
-          <a:bodyPr/>
+          <a:bodyPr>
+            <a:normAutofit/>
+          </a:bodyPr>
           <a:lstStyle/>
           <a:p>
             <a:r>
@@ -16052,7 +16054,15 @@
             </a:r>
             <a:r>
               <a:rPr lang="en-US" dirty="0" smtClean="0"/>
-              <a:t> 2016, Boulder Colorado, Justin Le (</a:t>
+              <a:t> 2016, Boulder </a:t>
+            </a:r>
+            <a:r>
+              <a:rPr lang="en-US" dirty="0" smtClean="0"/>
+              <a:t>Colorado, Justin </a:t>
+            </a:r>
+            <a:r>
+              <a:rPr lang="en-US" dirty="0" smtClean="0"/>
+              <a:t>Le (</a:t>
             </a:r>
             <a:r>
               <a:rPr lang="en-US" dirty="0" smtClean="0">
@@ -16062,8 +16072,25 @@
             </a:r>
             <a:r>
               <a:rPr lang="en-US" dirty="0" smtClean="0"/>
+              <a:t>) (</a:t>
+            </a:r>
+            <a:r>
+              <a:rPr lang="en-US" dirty="0" smtClean="0">
+                <a:hlinkClick r:id="rId4"/>
+              </a:rPr>
+              <a:t>github.com/</a:t>
+            </a:r>
+            <a:r>
+              <a:rPr lang="en-US" dirty="0" err="1" smtClean="0">
+                <a:hlinkClick r:id="rId4"/>
+              </a:rPr>
+              <a:t>mstksg</a:t>
+            </a:r>
+            <a:r>
+              <a:rPr lang="en-US" dirty="0"/>
               <a:t>)</a:t>
             </a:r>
+            <a:endParaRPr lang="en-US" dirty="0" smtClean="0"/>
           </a:p>
           <a:p>
             <a:endParaRPr lang="en-US" dirty="0" smtClean="0"/>
@@ -20784,13 +20811,7 @@
               <a:rPr lang="en-US" dirty="0" smtClean="0">
                 <a:latin typeface="+mj-lt"/>
               </a:rPr>
-              <a:t>“</a:t>
-            </a:r>
-            <a:r>
-              <a:rPr lang="en-US" dirty="0" smtClean="0">
-                <a:latin typeface="+mj-lt"/>
-              </a:rPr>
-              <a:t>Specify the new pixel value at that location”</a:t>
+              <a:t>“Specify the new pixel value at that location”</a:t>
             </a:r>
           </a:p>
           <a:p>
@@ -24141,7 +24162,6 @@
               <a:rPr lang="en-US" dirty="0" smtClean="0"/>
               <a:t>Behavior at boundaries</a:t>
             </a:r>
-            <a:endParaRPr lang="en-US" dirty="0" smtClean="0"/>
           </a:p>
           <a:p>
             <a:r>
@@ -24314,13 +24334,7 @@
               <a:rPr lang="en-US" dirty="0" smtClean="0">
                 <a:latin typeface="Lucida Console" panose="020B0609040504020204" pitchFamily="49" charset="0"/>
               </a:rPr>
-              <a:t>extend </a:t>
-            </a:r>
-            <a:r>
-              <a:rPr lang="en-US" dirty="0" smtClean="0">
-                <a:latin typeface="Lucida Console" panose="020B0609040504020204" pitchFamily="49" charset="0"/>
-              </a:rPr>
-              <a:t>extract = id</a:t>
+              <a:t>extend extract = id</a:t>
             </a:r>
           </a:p>
           <a:p>
@@ -24344,13 +24358,7 @@
               <a:rPr lang="en-US" dirty="0" smtClean="0">
                 <a:latin typeface="+mj-lt"/>
               </a:rPr>
-              <a:t>etc</a:t>
-            </a:r>
-            <a:r>
-              <a:rPr lang="en-US" dirty="0" smtClean="0">
-                <a:latin typeface="+mj-lt"/>
-              </a:rPr>
-              <a:t>.</a:t>
+              <a:t>etc.</a:t>
             </a:r>
           </a:p>
           <a:p>
@@ -24409,13 +24417,7 @@
               <a:rPr lang="en-US" dirty="0" smtClean="0">
                 <a:latin typeface="Lucida Console" panose="020B0609040504020204" pitchFamily="49" charset="0"/>
               </a:rPr>
-              <a:t>bind </a:t>
-            </a:r>
-            <a:r>
-              <a:rPr lang="en-US" dirty="0" smtClean="0">
-                <a:latin typeface="Lucida Console" panose="020B0609040504020204" pitchFamily="49" charset="0"/>
-              </a:rPr>
-              <a:t>return  = id</a:t>
+              <a:t>bind return  = id</a:t>
             </a:r>
           </a:p>
           <a:p>
@@ -25277,11 +25279,7 @@
           <a:p>
             <a:r>
               <a:rPr lang="en-US" dirty="0" smtClean="0"/>
-              <a:t>Arrows as Local </a:t>
-            </a:r>
-            <a:r>
-              <a:rPr lang="en-US" dirty="0" smtClean="0"/>
-              <a:t>Filters</a:t>
+              <a:t>Arrows as Local Filters</a:t>
             </a:r>
             <a:endParaRPr lang="en-US" dirty="0"/>
           </a:p>
@@ -25430,13 +25428,7 @@
               <a:rPr lang="en-US" dirty="0" smtClean="0">
                 <a:latin typeface="Lucida Console" panose="020B0609040504020204" pitchFamily="49" charset="0"/>
               </a:rPr>
-              <a:t> </a:t>
-            </a:r>
-            <a:r>
-              <a:rPr lang="en-US" dirty="0" smtClean="0">
-                <a:latin typeface="Lucida Console" panose="020B0609040504020204" pitchFamily="49" charset="0"/>
-              </a:rPr>
-              <a:t>(Tape (l:_) v (r:_)) = ((v – l) + (r – v)) / 2</a:t>
+              <a:t> (Tape (l:_) v (r:_)) = ((v – l) + (r – v)) / 2</a:t>
             </a:r>
           </a:p>
         </p:txBody>
@@ -25688,19 +25680,7 @@
               <a:rPr lang="en-US" dirty="0" smtClean="0">
                 <a:latin typeface="Lucida Console" panose="020B0609040504020204" pitchFamily="49" charset="0"/>
               </a:rPr>
-              <a:t> </a:t>
-            </a:r>
-            <a:r>
-              <a:rPr lang="en-US" dirty="0" smtClean="0">
-                <a:latin typeface="Lucida Console" panose="020B0609040504020204" pitchFamily="49" charset="0"/>
-              </a:rPr>
-              <a:t>t)</a:t>
-            </a:r>
-            <a:r>
-              <a:rPr lang="en-US" dirty="0" smtClean="0">
-                <a:latin typeface="Lucida Console" panose="020B0609040504020204" pitchFamily="49" charset="0"/>
-              </a:rPr>
-              <a:t/>
+              <a:t> t)</a:t>
             </a:r>
             <a:br>
               <a:rPr lang="en-US" dirty="0" smtClean="0">
@@ -25747,66 +25727,39 @@
               <a:rPr lang="en-US" dirty="0" smtClean="0">
                 <a:latin typeface="Lucida Console" panose="020B0609040504020204" pitchFamily="49" charset="0"/>
               </a:rPr>
-              <a:t>  </a:t>
-            </a:r>
+              <a:t>  t)</a:t>
+            </a:r>
+          </a:p>
+          <a:p>
             <a:r>
               <a:rPr lang="en-US" dirty="0" smtClean="0">
-                <a:latin typeface="Lucida Console" panose="020B0609040504020204" pitchFamily="49" charset="0"/>
-              </a:rPr>
-              <a:t>t)</a:t>
+                <a:latin typeface="+mj-lt"/>
+              </a:rPr>
+              <a:t>The power of composition</a:t>
             </a:r>
             <a:endParaRPr lang="en-US" dirty="0" smtClean="0">
               <a:latin typeface="Lucida Console" panose="020B0609040504020204" pitchFamily="49" charset="0"/>
             </a:endParaRPr>
           </a:p>
           <a:p>
+            <a:pPr lvl="1"/>
             <a:r>
               <a:rPr lang="en-US" dirty="0" smtClean="0">
-                <a:latin typeface="+mj-lt"/>
-              </a:rPr>
-              <a:t>The power of composition</a:t>
-            </a:r>
-            <a:endParaRPr lang="en-US" dirty="0" smtClean="0">
-              <a:latin typeface="Lucida Console" panose="020B0609040504020204" pitchFamily="49" charset="0"/>
-            </a:endParaRPr>
-          </a:p>
-          <a:p>
-            <a:pPr lvl="1"/>
+                <a:latin typeface="Lucida Console" panose="020B0609040504020204" pitchFamily="49" charset="0"/>
+              </a:rPr>
+              <a:t>deriv2     = </a:t>
+            </a:r>
+            <a:r>
+              <a:rPr lang="en-US" dirty="0" err="1" smtClean="0">
+                <a:latin typeface="Lucida Console" panose="020B0609040504020204" pitchFamily="49" charset="0"/>
+              </a:rPr>
+              <a:t>deriv</a:t>
+            </a:r>
             <a:r>
               <a:rPr lang="en-US" dirty="0" smtClean="0">
                 <a:latin typeface="Lucida Console" panose="020B0609040504020204" pitchFamily="49" charset="0"/>
               </a:rPr>
-              <a:t>deriv2</a:t>
-            </a:r>
-            <a:r>
-              <a:rPr lang="en-US" dirty="0" smtClean="0">
-                <a:latin typeface="Lucida Console" panose="020B0609040504020204" pitchFamily="49" charset="0"/>
-              </a:rPr>
-              <a:t>     </a:t>
-            </a:r>
-            <a:r>
-              <a:rPr lang="en-US" dirty="0" smtClean="0">
-                <a:latin typeface="Lucida Console" panose="020B0609040504020204" pitchFamily="49" charset="0"/>
-              </a:rPr>
-              <a:t>= </a:t>
-            </a:r>
-            <a:r>
-              <a:rPr lang="en-US" dirty="0" err="1" smtClean="0">
-                <a:latin typeface="Lucida Console" panose="020B0609040504020204" pitchFamily="49" charset="0"/>
-              </a:rPr>
-              <a:t>deriv</a:t>
-            </a:r>
-            <a:r>
-              <a:rPr lang="en-US" dirty="0" smtClean="0">
-                <a:latin typeface="Lucida Console" panose="020B0609040504020204" pitchFamily="49" charset="0"/>
-              </a:rPr>
-              <a:t> </a:t>
-            </a:r>
-            <a:r>
-              <a:rPr lang="en-US" dirty="0" smtClean="0">
-                <a:latin typeface="Lucida Console" panose="020B0609040504020204" pitchFamily="49" charset="0"/>
-              </a:rPr>
-              <a:t>&lt;=&lt; </a:t>
+              <a:t> &lt;=&lt; </a:t>
             </a:r>
             <a:r>
               <a:rPr lang="en-US" dirty="0" err="1" smtClean="0">
@@ -26231,58 +26184,37 @@
               <a:rPr lang="en-US" dirty="0" smtClean="0">
                 <a:latin typeface="+mj-lt"/>
               </a:rPr>
-              <a:t>, where the morphism </a:t>
+              <a:t>, where the morphism mapper is </a:t>
+            </a:r>
+            <a:r>
+              <a:rPr lang="en-US" dirty="0" smtClean="0">
+                <a:latin typeface="Lucida Console" panose="020B0609040504020204" pitchFamily="49" charset="0"/>
+              </a:rPr>
+              <a:t>globalize d</a:t>
             </a:r>
             <a:r>
               <a:rPr lang="en-US" dirty="0" smtClean="0">
                 <a:latin typeface="+mj-lt"/>
               </a:rPr>
-              <a:t>mapper </a:t>
-            </a:r>
+              <a:t>.</a:t>
+            </a:r>
+          </a:p>
+          <a:p>
             <a:r>
               <a:rPr lang="en-US" dirty="0" smtClean="0">
                 <a:latin typeface="+mj-lt"/>
               </a:rPr>
-              <a:t>is </a:t>
-            </a:r>
-            <a:r>
-              <a:rPr lang="en-US" dirty="0" smtClean="0">
-                <a:latin typeface="Lucida Console" panose="020B0609040504020204" pitchFamily="49" charset="0"/>
-              </a:rPr>
-              <a:t>globalize d</a:t>
-            </a:r>
+              <a:t>We have some choices!</a:t>
+            </a:r>
+          </a:p>
+          <a:p>
+            <a:pPr lvl="1"/>
             <a:r>
               <a:rPr lang="en-US" dirty="0" smtClean="0">
                 <a:latin typeface="+mj-lt"/>
               </a:rPr>
-              <a:t>.</a:t>
-            </a:r>
-          </a:p>
-          <a:p>
-            <a:r>
-              <a:rPr lang="en-US" dirty="0" smtClean="0">
-                <a:latin typeface="+mj-lt"/>
-              </a:rPr>
-              <a:t>We have some choices!</a:t>
-            </a:r>
-          </a:p>
-          <a:p>
-            <a:pPr lvl="1"/>
-            <a:r>
-              <a:rPr lang="en-US" dirty="0" smtClean="0">
-                <a:latin typeface="+mj-lt"/>
-              </a:rPr>
-              <a:t>Boundary </a:t>
-            </a:r>
-            <a:r>
-              <a:rPr lang="en-US" dirty="0" smtClean="0">
-                <a:latin typeface="+mj-lt"/>
-              </a:rPr>
-              <a:t>behaviors?</a:t>
-            </a:r>
-            <a:endParaRPr lang="en-US" dirty="0" smtClean="0">
-              <a:latin typeface="+mj-lt"/>
-            </a:endParaRPr>
+              <a:t>Boundary behaviors?</a:t>
+            </a:r>
           </a:p>
         </p:txBody>
       </p:sp>
@@ -27433,10 +27365,16 @@
           <a:lstStyle/>
           <a:p>
             <a:r>
+              <a:rPr lang="en-US" dirty="0" smtClean="0">
+                <a:hlinkClick r:id="rId2"/>
+              </a:rPr>
+              <a:t>http</a:t>
+            </a:r>
+            <a:r>
               <a:rPr lang="en-US" dirty="0">
                 <a:hlinkClick r:id="rId2"/>
               </a:rPr>
-              <a:t>http://</a:t>
+              <a:t>://</a:t>
             </a:r>
             <a:r>
               <a:rPr lang="en-US" dirty="0" smtClean="0">
@@ -27498,6 +27436,38 @@
             <a:endParaRPr lang="en-US" dirty="0"/>
           </a:p>
           <a:p>
+            <a:r>
+              <a:rPr lang="en-US" dirty="0">
+                <a:hlinkClick r:id="rId4"/>
+              </a:rPr>
+              <a:t>https</a:t>
+            </a:r>
+            <a:r>
+              <a:rPr lang="en-US">
+                <a:hlinkClick r:id="rId4"/>
+              </a:rPr>
+              <a:t>://</a:t>
+            </a:r>
+            <a:r>
+              <a:rPr lang="en-US" smtClean="0">
+                <a:hlinkClick r:id="rId4"/>
+              </a:rPr>
+              <a:t>github.com/mstksg/lambdaconf-2016-usa/tree/master/Functors, </a:t>
+            </a:r>
+            <a:r>
+              <a:rPr lang="en-US" dirty="0" smtClean="0">
+                <a:hlinkClick r:id="rId4"/>
+              </a:rPr>
+              <a:t>Comonads, and Digital Image Processing</a:t>
+            </a:r>
+            <a:endParaRPr lang="en-US" dirty="0" smtClean="0"/>
+          </a:p>
+          <a:p>
+            <a:pPr lvl="1"/>
+            <a:r>
+              <a:rPr lang="en-US" dirty="0" smtClean="0"/>
+              <a:t>Slides online</a:t>
+            </a:r>
             <a:endParaRPr lang="en-US" dirty="0"/>
           </a:p>
         </p:txBody>
@@ -28528,17 +28498,8 @@
             </a:r>
             <a:r>
               <a:rPr lang="en-US" dirty="0" smtClean="0"/>
-              <a:t>? (Besides </a:t>
-            </a:r>
-            <a:r>
-              <a:rPr lang="en-US" dirty="0" smtClean="0"/>
-              <a:t>it being a list</a:t>
-            </a:r>
-            <a:r>
-              <a:rPr lang="en-US" dirty="0" smtClean="0"/>
-              <a:t>)</a:t>
-            </a:r>
-            <a:endParaRPr lang="en-US" dirty="0" smtClean="0"/>
+              <a:t>? (Besides it being a list)</a:t>
+            </a:r>
           </a:p>
           <a:p>
             <a:r>
@@ -28578,7 +28539,6 @@
               <a:rPr lang="en-US" dirty="0" smtClean="0"/>
               <a:t>?</a:t>
             </a:r>
-            <a:endParaRPr lang="en-US" dirty="0" smtClean="0"/>
           </a:p>
           <a:p>
             <a:pPr lvl="2"/>

</xml_diff>